<commit_message>
- add swagger.yaml for api documentation | 07/08/2021 - revise presentation slide | 07/08/2021
</commit_message>
<xml_diff>
--- a/Presentasi/Movie Wishlist.pptx
+++ b/Presentasi/Movie Wishlist.pptx
@@ -286,7 +286,7 @@
           <a:p>
             <a:fld id="{9184DA70-C731-4C70-880D-CCD4705E623C}" type="datetime1">
               <a:rPr lang="en-US" smtClean="0"/>
-              <a:t>8/2/2021</a:t>
+              <a:t>8/7/2021</a:t>
             </a:fld>
             <a:endParaRPr lang="en-US" dirty="0"/>
           </a:p>
@@ -553,7 +553,7 @@
           <a:p>
             <a:fld id="{62D6E202-B606-4609-B914-27C9371A1F6D}" type="datetime1">
               <a:rPr lang="en-US" smtClean="0"/>
-              <a:t>8/2/2021</a:t>
+              <a:t>8/7/2021</a:t>
             </a:fld>
             <a:endParaRPr lang="en-US" dirty="0"/>
           </a:p>
@@ -785,7 +785,7 @@
           <a:p>
             <a:fld id="{62D6E202-B606-4609-B914-27C9371A1F6D}" type="datetime1">
               <a:rPr lang="en-US" smtClean="0"/>
-              <a:t>8/2/2021</a:t>
+              <a:t>8/7/2021</a:t>
             </a:fld>
             <a:endParaRPr lang="en-US" dirty="0"/>
           </a:p>
@@ -1096,7 +1096,7 @@
           <a:p>
             <a:fld id="{62D6E202-B606-4609-B914-27C9371A1F6D}" type="datetime1">
               <a:rPr lang="en-US" smtClean="0"/>
-              <a:t>8/2/2021</a:t>
+              <a:t>8/7/2021</a:t>
             </a:fld>
             <a:endParaRPr lang="en-US" dirty="0"/>
           </a:p>
@@ -1570,7 +1570,7 @@
           <a:p>
             <a:fld id="{62D6E202-B606-4609-B914-27C9371A1F6D}" type="datetime1">
               <a:rPr lang="en-US" smtClean="0"/>
-              <a:t>8/2/2021</a:t>
+              <a:t>8/7/2021</a:t>
             </a:fld>
             <a:endParaRPr lang="en-US" dirty="0"/>
           </a:p>
@@ -2118,7 +2118,7 @@
           <a:p>
             <a:fld id="{62D6E202-B606-4609-B914-27C9371A1F6D}" type="datetime1">
               <a:rPr lang="en-US" smtClean="0"/>
-              <a:t>8/2/2021</a:t>
+              <a:t>8/7/2021</a:t>
             </a:fld>
             <a:endParaRPr lang="en-US" dirty="0"/>
           </a:p>
@@ -2893,7 +2893,7 @@
           <a:p>
             <a:fld id="{62D6E202-B606-4609-B914-27C9371A1F6D}" type="datetime1">
               <a:rPr lang="en-US" smtClean="0"/>
-              <a:t>8/2/2021</a:t>
+              <a:t>8/7/2021</a:t>
             </a:fld>
             <a:endParaRPr lang="en-US" dirty="0"/>
           </a:p>
@@ -3069,7 +3069,7 @@
           <a:p>
             <a:fld id="{B612A279-0833-481D-8C56-F67FD0AC6C50}" type="datetime1">
               <a:rPr lang="en-US" smtClean="0"/>
-              <a:t>8/2/2021</a:t>
+              <a:t>8/7/2021</a:t>
             </a:fld>
             <a:endParaRPr lang="en-US" dirty="0"/>
           </a:p>
@@ -3292,7 +3292,7 @@
           <a:p>
             <a:fld id="{6587DA83-5663-4C9C-B9AA-0B40A3DAFF81}" type="datetime1">
               <a:rPr lang="en-US" smtClean="0"/>
-              <a:t>8/2/2021</a:t>
+              <a:t>8/7/2021</a:t>
             </a:fld>
             <a:endParaRPr lang="en-US" dirty="0"/>
           </a:p>
@@ -3472,7 +3472,7 @@
           <a:p>
             <a:fld id="{4BE1D723-8F53-4F53-90B0-1982A396982E}" type="datetime1">
               <a:rPr lang="en-US" smtClean="0"/>
-              <a:t>8/2/2021</a:t>
+              <a:t>8/7/2021</a:t>
             </a:fld>
             <a:endParaRPr lang="en-US" dirty="0"/>
           </a:p>
@@ -3761,7 +3761,7 @@
           <a:p>
             <a:fld id="{97669AF7-7BEB-44E4-9852-375E34362B5B}" type="datetime1">
               <a:rPr lang="en-US" smtClean="0"/>
-              <a:t>8/2/2021</a:t>
+              <a:t>8/7/2021</a:t>
             </a:fld>
             <a:endParaRPr lang="en-US" dirty="0"/>
           </a:p>
@@ -4003,7 +4003,7 @@
           <a:p>
             <a:fld id="{BAAAC38D-0552-4C82-B593-E6124DFADBE2}" type="datetime1">
               <a:rPr lang="en-US" smtClean="0"/>
-              <a:t>8/2/2021</a:t>
+              <a:t>8/7/2021</a:t>
             </a:fld>
             <a:endParaRPr lang="en-US" dirty="0"/>
           </a:p>
@@ -4382,7 +4382,7 @@
           <a:p>
             <a:fld id="{D9DF0F1C-5577-4ACB-BB62-DF8F3C494C7E}" type="datetime1">
               <a:rPr lang="en-US" smtClean="0"/>
-              <a:t>8/2/2021</a:t>
+              <a:t>8/7/2021</a:t>
             </a:fld>
             <a:endParaRPr lang="en-US" dirty="0"/>
           </a:p>
@@ -4500,7 +4500,7 @@
           <a:p>
             <a:fld id="{1775B394-D9F9-4F0C-B15D-605F45CB9E9F}" type="datetime1">
               <a:rPr lang="en-US" smtClean="0"/>
-              <a:t>8/2/2021</a:t>
+              <a:t>8/7/2021</a:t>
             </a:fld>
             <a:endParaRPr lang="en-US" dirty="0"/>
           </a:p>
@@ -4595,7 +4595,7 @@
           <a:p>
             <a:fld id="{39667345-2558-425A-8533-9BFDBCE15005}" type="datetime1">
               <a:rPr lang="en-US" smtClean="0"/>
-              <a:t>8/2/2021</a:t>
+              <a:t>8/7/2021</a:t>
             </a:fld>
             <a:endParaRPr lang="en-US" dirty="0"/>
           </a:p>
@@ -4844,7 +4844,7 @@
           <a:p>
             <a:fld id="{92BEA474-078D-4E9B-9B14-09A87B19DC46}" type="datetime1">
               <a:rPr lang="en-US" smtClean="0"/>
-              <a:t>8/2/2021</a:t>
+              <a:t>8/7/2021</a:t>
             </a:fld>
             <a:endParaRPr lang="en-US" dirty="0"/>
           </a:p>
@@ -5102,7 +5102,7 @@
           <a:p>
             <a:fld id="{4907D986-8816-4272-A432-0437A28A9828}" type="datetime1">
               <a:rPr lang="en-US" smtClean="0"/>
-              <a:t>8/2/2021</a:t>
+              <a:t>8/7/2021</a:t>
             </a:fld>
             <a:endParaRPr lang="en-US" dirty="0"/>
           </a:p>
@@ -5346,7 +5346,7 @@
           <a:p>
             <a:fld id="{62D6E202-B606-4609-B914-27C9371A1F6D}" type="datetime1">
               <a:rPr lang="en-US" smtClean="0"/>
-              <a:t>8/2/2021</a:t>
+              <a:t>8/7/2021</a:t>
             </a:fld>
             <a:endParaRPr lang="en-US" dirty="0"/>
           </a:p>
@@ -8034,7 +8034,7 @@
               </a:ext>
             </a:extLst>
           </a:blip>
-          <a:srcRect l="1628" r="1628"/>
+          <a:srcRect l="8112" r="8112"/>
           <a:stretch/>
         </p:blipFill>
         <p:spPr>

</xml_diff>

<commit_message>
add test file for helpers/encrypt/bcrypt_test.go, businesses/linktrailers/usecase_test.go, add mockery plugin. Note : function update in test case 1 still failure when test running, but when the update function is disable, test case 1 will work fine, still not found the solution. The function of test in usecase linktrailers still not completed for all function. | 22082021
</commit_message>
<xml_diff>
--- a/Presentasi/Movie Wishlist.pptx
+++ b/Presentasi/Movie Wishlist.pptx
@@ -2253,7 +2253,7 @@
           <a:p>
             <a:fld id="{9184DA70-C731-4C70-880D-CCD4705E623C}" type="datetime1">
               <a:rPr lang="en-US" smtClean="0"/>
-              <a:t>8/18/2021</a:t>
+              <a:t>8/19/2021</a:t>
             </a:fld>
             <a:endParaRPr lang="en-US" dirty="0"/>
           </a:p>
@@ -2520,7 +2520,7 @@
           <a:p>
             <a:fld id="{62D6E202-B606-4609-B914-27C9371A1F6D}" type="datetime1">
               <a:rPr lang="en-US" smtClean="0"/>
-              <a:t>8/18/2021</a:t>
+              <a:t>8/19/2021</a:t>
             </a:fld>
             <a:endParaRPr lang="en-US" dirty="0"/>
           </a:p>
@@ -2752,7 +2752,7 @@
           <a:p>
             <a:fld id="{62D6E202-B606-4609-B914-27C9371A1F6D}" type="datetime1">
               <a:rPr lang="en-US" smtClean="0"/>
-              <a:t>8/18/2021</a:t>
+              <a:t>8/19/2021</a:t>
             </a:fld>
             <a:endParaRPr lang="en-US" dirty="0"/>
           </a:p>
@@ -3063,7 +3063,7 @@
           <a:p>
             <a:fld id="{62D6E202-B606-4609-B914-27C9371A1F6D}" type="datetime1">
               <a:rPr lang="en-US" smtClean="0"/>
-              <a:t>8/18/2021</a:t>
+              <a:t>8/19/2021</a:t>
             </a:fld>
             <a:endParaRPr lang="en-US" dirty="0"/>
           </a:p>
@@ -3537,7 +3537,7 @@
           <a:p>
             <a:fld id="{62D6E202-B606-4609-B914-27C9371A1F6D}" type="datetime1">
               <a:rPr lang="en-US" smtClean="0"/>
-              <a:t>8/18/2021</a:t>
+              <a:t>8/19/2021</a:t>
             </a:fld>
             <a:endParaRPr lang="en-US" dirty="0"/>
           </a:p>
@@ -4085,7 +4085,7 @@
           <a:p>
             <a:fld id="{62D6E202-B606-4609-B914-27C9371A1F6D}" type="datetime1">
               <a:rPr lang="en-US" smtClean="0"/>
-              <a:t>8/18/2021</a:t>
+              <a:t>8/19/2021</a:t>
             </a:fld>
             <a:endParaRPr lang="en-US" dirty="0"/>
           </a:p>
@@ -4860,7 +4860,7 @@
           <a:p>
             <a:fld id="{62D6E202-B606-4609-B914-27C9371A1F6D}" type="datetime1">
               <a:rPr lang="en-US" smtClean="0"/>
-              <a:t>8/18/2021</a:t>
+              <a:t>8/19/2021</a:t>
             </a:fld>
             <a:endParaRPr lang="en-US" dirty="0"/>
           </a:p>
@@ -5036,7 +5036,7 @@
           <a:p>
             <a:fld id="{B612A279-0833-481D-8C56-F67FD0AC6C50}" type="datetime1">
               <a:rPr lang="en-US" smtClean="0"/>
-              <a:t>8/18/2021</a:t>
+              <a:t>8/19/2021</a:t>
             </a:fld>
             <a:endParaRPr lang="en-US" dirty="0"/>
           </a:p>
@@ -5259,7 +5259,7 @@
           <a:p>
             <a:fld id="{6587DA83-5663-4C9C-B9AA-0B40A3DAFF81}" type="datetime1">
               <a:rPr lang="en-US" smtClean="0"/>
-              <a:t>8/18/2021</a:t>
+              <a:t>8/19/2021</a:t>
             </a:fld>
             <a:endParaRPr lang="en-US" dirty="0"/>
           </a:p>
@@ -5439,7 +5439,7 @@
           <a:p>
             <a:fld id="{4BE1D723-8F53-4F53-90B0-1982A396982E}" type="datetime1">
               <a:rPr lang="en-US" smtClean="0"/>
-              <a:t>8/18/2021</a:t>
+              <a:t>8/19/2021</a:t>
             </a:fld>
             <a:endParaRPr lang="en-US" dirty="0"/>
           </a:p>
@@ -5728,7 +5728,7 @@
           <a:p>
             <a:fld id="{97669AF7-7BEB-44E4-9852-375E34362B5B}" type="datetime1">
               <a:rPr lang="en-US" smtClean="0"/>
-              <a:t>8/18/2021</a:t>
+              <a:t>8/19/2021</a:t>
             </a:fld>
             <a:endParaRPr lang="en-US" dirty="0"/>
           </a:p>
@@ -5970,7 +5970,7 @@
           <a:p>
             <a:fld id="{BAAAC38D-0552-4C82-B593-E6124DFADBE2}" type="datetime1">
               <a:rPr lang="en-US" smtClean="0"/>
-              <a:t>8/18/2021</a:t>
+              <a:t>8/19/2021</a:t>
             </a:fld>
             <a:endParaRPr lang="en-US" dirty="0"/>
           </a:p>
@@ -6349,7 +6349,7 @@
           <a:p>
             <a:fld id="{D9DF0F1C-5577-4ACB-BB62-DF8F3C494C7E}" type="datetime1">
               <a:rPr lang="en-US" smtClean="0"/>
-              <a:t>8/18/2021</a:t>
+              <a:t>8/19/2021</a:t>
             </a:fld>
             <a:endParaRPr lang="en-US" dirty="0"/>
           </a:p>
@@ -6467,7 +6467,7 @@
           <a:p>
             <a:fld id="{1775B394-D9F9-4F0C-B15D-605F45CB9E9F}" type="datetime1">
               <a:rPr lang="en-US" smtClean="0"/>
-              <a:t>8/18/2021</a:t>
+              <a:t>8/19/2021</a:t>
             </a:fld>
             <a:endParaRPr lang="en-US" dirty="0"/>
           </a:p>
@@ -6562,7 +6562,7 @@
           <a:p>
             <a:fld id="{39667345-2558-425A-8533-9BFDBCE15005}" type="datetime1">
               <a:rPr lang="en-US" smtClean="0"/>
-              <a:t>8/18/2021</a:t>
+              <a:t>8/19/2021</a:t>
             </a:fld>
             <a:endParaRPr lang="en-US" dirty="0"/>
           </a:p>
@@ -6811,7 +6811,7 @@
           <a:p>
             <a:fld id="{92BEA474-078D-4E9B-9B14-09A87B19DC46}" type="datetime1">
               <a:rPr lang="en-US" smtClean="0"/>
-              <a:t>8/18/2021</a:t>
+              <a:t>8/19/2021</a:t>
             </a:fld>
             <a:endParaRPr lang="en-US" dirty="0"/>
           </a:p>
@@ -7069,7 +7069,7 @@
           <a:p>
             <a:fld id="{4907D986-8816-4272-A432-0437A28A9828}" type="datetime1">
               <a:rPr lang="en-US" smtClean="0"/>
-              <a:t>8/18/2021</a:t>
+              <a:t>8/19/2021</a:t>
             </a:fld>
             <a:endParaRPr lang="en-US" dirty="0"/>
           </a:p>
@@ -7313,7 +7313,7 @@
           <a:p>
             <a:fld id="{62D6E202-B606-4609-B914-27C9371A1F6D}" type="datetime1">
               <a:rPr lang="en-US" smtClean="0"/>
-              <a:t>8/18/2021</a:t>
+              <a:t>8/19/2021</a:t>
             </a:fld>
             <a:endParaRPr lang="en-US" dirty="0"/>
           </a:p>
@@ -13034,9 +13034,13 @@
             </a:br>
             <a:r>
               <a:rPr lang="en-US" sz="1600" cap="none" dirty="0">
-                <a:solidFill>
-                  <a:srgbClr val="FFFFFF"/>
-                </a:solidFill>
+                <a:hlinkClick r:id="rId2">
+                  <a:extLst>
+                    <a:ext uri="{A12FA001-AC4F-418D-AE19-62706E023703}">
+                      <ahyp:hlinkClr xmlns:ahyp="http://schemas.microsoft.com/office/drawing/2018/hyperlinkcolor" val="tx"/>
+                    </a:ext>
+                  </a:extLst>
+                </a:hlinkClick>
               </a:rPr>
               <a:t>https://github.com/bk88collab/be-project</a:t>
             </a:r>
@@ -13230,7 +13234,7 @@
           <p:nvPr/>
         </p:nvPicPr>
         <p:blipFill>
-          <a:blip r:embed="rId2"/>
+          <a:blip r:embed="rId3"/>
           <a:stretch>
             <a:fillRect/>
           </a:stretch>
@@ -13260,7 +13264,7 @@
           <p:nvPr/>
         </p:nvPicPr>
         <p:blipFill>
-          <a:blip r:embed="rId3"/>
+          <a:blip r:embed="rId4"/>
           <a:stretch>
             <a:fillRect/>
           </a:stretch>

</xml_diff>